<commit_message>
Updated Documentation and Began File Generation
</commit_message>
<xml_diff>
--- a/z.ReadMeAssets/ASeGrapheneDetector.pptx
+++ b/z.ReadMeAssets/ASeGrapheneDetector.pptx
@@ -5448,6 +5448,41 @@
           </a:p>
         </p:txBody>
       </p:sp>
+      <p:pic>
+        <p:nvPicPr>
+          <p:cNvPr id="3" name="Picture 2">
+            <a:extLst>
+              <a:ext uri="{FF2B5EF4-FFF2-40B4-BE49-F238E27FC236}">
+                <a16:creationId xmlns:a16="http://schemas.microsoft.com/office/drawing/2014/main" id="{E790FCEF-998D-DC18-A6A9-0B6F49EC01D6}"/>
+              </a:ext>
+            </a:extLst>
+          </p:cNvPr>
+          <p:cNvPicPr>
+            <a:picLocks noChangeAspect="1"/>
+          </p:cNvPicPr>
+          <p:nvPr/>
+        </p:nvPicPr>
+        <p:blipFill>
+          <a:blip r:embed="rId8"/>
+          <a:stretch>
+            <a:fillRect/>
+          </a:stretch>
+        </p:blipFill>
+        <p:spPr>
+          <a:xfrm>
+            <a:off x="4153974" y="4287679"/>
+            <a:ext cx="2766500" cy="1785020"/>
+          </a:xfrm>
+          <a:prstGeom prst="rect">
+            <a:avLst/>
+          </a:prstGeom>
+          <a:ln w="3175">
+            <a:solidFill>
+              <a:schemeClr val="tx1"/>
+            </a:solidFill>
+          </a:ln>
+        </p:spPr>
+      </p:pic>
     </p:spTree>
     <p:extLst>
       <p:ext uri="{BB962C8B-B14F-4D97-AF65-F5344CB8AC3E}">

</xml_diff>

<commit_message>
Updated DXF files and Slides
</commit_message>
<xml_diff>
--- a/z.ReadMeAssets/ASeGrapheneDetector.pptx
+++ b/z.ReadMeAssets/ASeGrapheneDetector.pptx
@@ -263,7 +263,7 @@
           <a:p>
             <a:fld id="{0FDF81D3-AF8D-4441-8312-2AC07D86F629}" type="datetimeFigureOut">
               <a:rPr lang="en-US" smtClean="0"/>
-              <a:t>10/3/2024</a:t>
+              <a:t>10/4/2024</a:t>
             </a:fld>
             <a:endParaRPr lang="en-US"/>
           </a:p>
@@ -461,7 +461,7 @@
           <a:p>
             <a:fld id="{0FDF81D3-AF8D-4441-8312-2AC07D86F629}" type="datetimeFigureOut">
               <a:rPr lang="en-US" smtClean="0"/>
-              <a:t>10/3/2024</a:t>
+              <a:t>10/4/2024</a:t>
             </a:fld>
             <a:endParaRPr lang="en-US"/>
           </a:p>
@@ -669,7 +669,7 @@
           <a:p>
             <a:fld id="{0FDF81D3-AF8D-4441-8312-2AC07D86F629}" type="datetimeFigureOut">
               <a:rPr lang="en-US" smtClean="0"/>
-              <a:t>10/3/2024</a:t>
+              <a:t>10/4/2024</a:t>
             </a:fld>
             <a:endParaRPr lang="en-US"/>
           </a:p>
@@ -867,7 +867,7 @@
           <a:p>
             <a:fld id="{0FDF81D3-AF8D-4441-8312-2AC07D86F629}" type="datetimeFigureOut">
               <a:rPr lang="en-US" smtClean="0"/>
-              <a:t>10/3/2024</a:t>
+              <a:t>10/4/2024</a:t>
             </a:fld>
             <a:endParaRPr lang="en-US"/>
           </a:p>
@@ -1142,7 +1142,7 @@
           <a:p>
             <a:fld id="{0FDF81D3-AF8D-4441-8312-2AC07D86F629}" type="datetimeFigureOut">
               <a:rPr lang="en-US" smtClean="0"/>
-              <a:t>10/3/2024</a:t>
+              <a:t>10/4/2024</a:t>
             </a:fld>
             <a:endParaRPr lang="en-US"/>
           </a:p>
@@ -1407,7 +1407,7 @@
           <a:p>
             <a:fld id="{0FDF81D3-AF8D-4441-8312-2AC07D86F629}" type="datetimeFigureOut">
               <a:rPr lang="en-US" smtClean="0"/>
-              <a:t>10/3/2024</a:t>
+              <a:t>10/4/2024</a:t>
             </a:fld>
             <a:endParaRPr lang="en-US"/>
           </a:p>
@@ -1819,7 +1819,7 @@
           <a:p>
             <a:fld id="{0FDF81D3-AF8D-4441-8312-2AC07D86F629}" type="datetimeFigureOut">
               <a:rPr lang="en-US" smtClean="0"/>
-              <a:t>10/3/2024</a:t>
+              <a:t>10/4/2024</a:t>
             </a:fld>
             <a:endParaRPr lang="en-US"/>
           </a:p>
@@ -1960,7 +1960,7 @@
           <a:p>
             <a:fld id="{0FDF81D3-AF8D-4441-8312-2AC07D86F629}" type="datetimeFigureOut">
               <a:rPr lang="en-US" smtClean="0"/>
-              <a:t>10/3/2024</a:t>
+              <a:t>10/4/2024</a:t>
             </a:fld>
             <a:endParaRPr lang="en-US"/>
           </a:p>
@@ -2073,7 +2073,7 @@
           <a:p>
             <a:fld id="{0FDF81D3-AF8D-4441-8312-2AC07D86F629}" type="datetimeFigureOut">
               <a:rPr lang="en-US" smtClean="0"/>
-              <a:t>10/3/2024</a:t>
+              <a:t>10/4/2024</a:t>
             </a:fld>
             <a:endParaRPr lang="en-US"/>
           </a:p>
@@ -2384,7 +2384,7 @@
           <a:p>
             <a:fld id="{0FDF81D3-AF8D-4441-8312-2AC07D86F629}" type="datetimeFigureOut">
               <a:rPr lang="en-US" smtClean="0"/>
-              <a:t>10/3/2024</a:t>
+              <a:t>10/4/2024</a:t>
             </a:fld>
             <a:endParaRPr lang="en-US"/>
           </a:p>
@@ -2672,7 +2672,7 @@
           <a:p>
             <a:fld id="{0FDF81D3-AF8D-4441-8312-2AC07D86F629}" type="datetimeFigureOut">
               <a:rPr lang="en-US" smtClean="0"/>
-              <a:t>10/3/2024</a:t>
+              <a:t>10/4/2024</a:t>
             </a:fld>
             <a:endParaRPr lang="en-US"/>
           </a:p>
@@ -2913,7 +2913,7 @@
           <a:p>
             <a:fld id="{0FDF81D3-AF8D-4441-8312-2AC07D86F629}" type="datetimeFigureOut">
               <a:rPr lang="en-US" smtClean="0"/>
-              <a:t>10/3/2024</a:t>
+              <a:t>10/4/2024</a:t>
             </a:fld>
             <a:endParaRPr lang="en-US"/>
           </a:p>
@@ -4436,6 +4436,84 @@
           </a:prstGeom>
         </p:spPr>
       </p:pic>
+      <p:sp>
+        <p:nvSpPr>
+          <p:cNvPr id="4" name="TextBox 3">
+            <a:extLst>
+              <a:ext uri="{FF2B5EF4-FFF2-40B4-BE49-F238E27FC236}">
+                <a16:creationId xmlns:a16="http://schemas.microsoft.com/office/drawing/2014/main" id="{8BCB22EB-608E-91E9-A6AC-6DD430CE863B}"/>
+              </a:ext>
+            </a:extLst>
+          </p:cNvPr>
+          <p:cNvSpPr txBox="1"/>
+          <p:nvPr/>
+        </p:nvSpPr>
+        <p:spPr>
+          <a:xfrm>
+            <a:off x="3016578" y="3039606"/>
+            <a:ext cx="1784118" cy="276999"/>
+          </a:xfrm>
+          <a:prstGeom prst="rect">
+            <a:avLst/>
+          </a:prstGeom>
+          <a:noFill/>
+          <a:ln>
+            <a:noFill/>
+          </a:ln>
+        </p:spPr>
+        <p:txBody>
+          <a:bodyPr wrap="square" rtlCol="0">
+            <a:spAutoFit/>
+          </a:bodyPr>
+          <a:lstStyle/>
+          <a:p>
+            <a:pPr algn="ctr"/>
+            <a:r>
+              <a:rPr lang="en-US" sz="1200" dirty="0"/>
+              <a:t>Base Conductor Mask</a:t>
+            </a:r>
+          </a:p>
+        </p:txBody>
+      </p:sp>
+      <p:sp>
+        <p:nvSpPr>
+          <p:cNvPr id="6" name="TextBox 5">
+            <a:extLst>
+              <a:ext uri="{FF2B5EF4-FFF2-40B4-BE49-F238E27FC236}">
+                <a16:creationId xmlns:a16="http://schemas.microsoft.com/office/drawing/2014/main" id="{7EBBBDAE-4089-1708-E258-12028505C11E}"/>
+              </a:ext>
+            </a:extLst>
+          </p:cNvPr>
+          <p:cNvSpPr txBox="1"/>
+          <p:nvPr/>
+        </p:nvSpPr>
+        <p:spPr>
+          <a:xfrm>
+            <a:off x="3011214" y="6438434"/>
+            <a:ext cx="1784118" cy="276999"/>
+          </a:xfrm>
+          <a:prstGeom prst="rect">
+            <a:avLst/>
+          </a:prstGeom>
+          <a:noFill/>
+          <a:ln>
+            <a:noFill/>
+          </a:ln>
+        </p:spPr>
+        <p:txBody>
+          <a:bodyPr wrap="square" rtlCol="0">
+            <a:spAutoFit/>
+          </a:bodyPr>
+          <a:lstStyle/>
+          <a:p>
+            <a:pPr algn="ctr"/>
+            <a:r>
+              <a:rPr lang="en-US" sz="1200" dirty="0"/>
+              <a:t>Test Material Mask</a:t>
+            </a:r>
+          </a:p>
+        </p:txBody>
+      </p:sp>
     </p:spTree>
     <p:extLst>
       <p:ext uri="{BB962C8B-B14F-4D97-AF65-F5344CB8AC3E}">
@@ -4823,6 +4901,84 @@
           </a:p>
         </p:txBody>
       </p:sp>
+      <p:sp>
+        <p:nvSpPr>
+          <p:cNvPr id="3" name="TextBox 2">
+            <a:extLst>
+              <a:ext uri="{FF2B5EF4-FFF2-40B4-BE49-F238E27FC236}">
+                <a16:creationId xmlns:a16="http://schemas.microsoft.com/office/drawing/2014/main" id="{F349917F-6406-A0C0-7240-36470E219176}"/>
+              </a:ext>
+            </a:extLst>
+          </p:cNvPr>
+          <p:cNvSpPr txBox="1"/>
+          <p:nvPr/>
+        </p:nvSpPr>
+        <p:spPr>
+          <a:xfrm>
+            <a:off x="3016578" y="3039606"/>
+            <a:ext cx="1784118" cy="276999"/>
+          </a:xfrm>
+          <a:prstGeom prst="rect">
+            <a:avLst/>
+          </a:prstGeom>
+          <a:noFill/>
+          <a:ln>
+            <a:noFill/>
+          </a:ln>
+        </p:spPr>
+        <p:txBody>
+          <a:bodyPr wrap="square" rtlCol="0">
+            <a:spAutoFit/>
+          </a:bodyPr>
+          <a:lstStyle/>
+          <a:p>
+            <a:pPr algn="ctr"/>
+            <a:r>
+              <a:rPr lang="en-US" sz="1200" dirty="0"/>
+              <a:t>Top Conductor 1 Mask</a:t>
+            </a:r>
+          </a:p>
+        </p:txBody>
+      </p:sp>
+      <p:sp>
+        <p:nvSpPr>
+          <p:cNvPr id="4" name="TextBox 3">
+            <a:extLst>
+              <a:ext uri="{FF2B5EF4-FFF2-40B4-BE49-F238E27FC236}">
+                <a16:creationId xmlns:a16="http://schemas.microsoft.com/office/drawing/2014/main" id="{5F0DCB1B-3008-2CEB-1C08-E49D6CB74C81}"/>
+              </a:ext>
+            </a:extLst>
+          </p:cNvPr>
+          <p:cNvSpPr txBox="1"/>
+          <p:nvPr/>
+        </p:nvSpPr>
+        <p:spPr>
+          <a:xfrm>
+            <a:off x="3011214" y="6438434"/>
+            <a:ext cx="1784118" cy="276999"/>
+          </a:xfrm>
+          <a:prstGeom prst="rect">
+            <a:avLst/>
+          </a:prstGeom>
+          <a:noFill/>
+          <a:ln>
+            <a:noFill/>
+          </a:ln>
+        </p:spPr>
+        <p:txBody>
+          <a:bodyPr wrap="square" rtlCol="0">
+            <a:spAutoFit/>
+          </a:bodyPr>
+          <a:lstStyle/>
+          <a:p>
+            <a:pPr algn="ctr"/>
+            <a:r>
+              <a:rPr lang="en-US" sz="1200" dirty="0"/>
+              <a:t>Top Conductor 2 Mask</a:t>
+            </a:r>
+          </a:p>
+        </p:txBody>
+      </p:sp>
     </p:spTree>
     <p:extLst>
       <p:ext uri="{BB962C8B-B14F-4D97-AF65-F5344CB8AC3E}">
@@ -5502,6 +5658,94 @@
               <a:schemeClr val="tx1"/>
             </a:solidFill>
           </a:ln>
+        </p:spPr>
+      </p:pic>
+      <p:pic>
+        <p:nvPicPr>
+          <p:cNvPr id="9" name="Picture 8">
+            <a:extLst>
+              <a:ext uri="{FF2B5EF4-FFF2-40B4-BE49-F238E27FC236}">
+                <a16:creationId xmlns:a16="http://schemas.microsoft.com/office/drawing/2014/main" id="{120A6B85-FCDE-3631-3F8E-FBEA9997CB49}"/>
+              </a:ext>
+            </a:extLst>
+          </p:cNvPr>
+          <p:cNvPicPr>
+            <a:picLocks noChangeAspect="1"/>
+          </p:cNvPicPr>
+          <p:nvPr/>
+        </p:nvPicPr>
+        <p:blipFill>
+          <a:blip r:embed="rId9"/>
+          <a:srcRect l="6187" t="4273" r="5388" b="7313"/>
+          <a:stretch/>
+        </p:blipFill>
+        <p:spPr>
+          <a:xfrm>
+            <a:off x="6156325" y="1775096"/>
+            <a:ext cx="1669530" cy="1659982"/>
+          </a:xfrm>
+          <a:prstGeom prst="rect">
+            <a:avLst/>
+          </a:prstGeom>
+        </p:spPr>
+      </p:pic>
+      <p:pic>
+        <p:nvPicPr>
+          <p:cNvPr id="11" name="Picture 10">
+            <a:extLst>
+              <a:ext uri="{FF2B5EF4-FFF2-40B4-BE49-F238E27FC236}">
+                <a16:creationId xmlns:a16="http://schemas.microsoft.com/office/drawing/2014/main" id="{DB81CE09-B4CC-1E29-1466-E70D02D53A0C}"/>
+              </a:ext>
+            </a:extLst>
+          </p:cNvPr>
+          <p:cNvPicPr>
+            <a:picLocks noChangeAspect="1"/>
+          </p:cNvPicPr>
+          <p:nvPr/>
+        </p:nvPicPr>
+        <p:blipFill>
+          <a:blip r:embed="rId10"/>
+          <a:srcRect l="4822" t="1262" r="2689" b="1681"/>
+          <a:stretch/>
+        </p:blipFill>
+        <p:spPr>
+          <a:xfrm>
+            <a:off x="4398214" y="1809750"/>
+            <a:ext cx="1596186" cy="1590675"/>
+          </a:xfrm>
+          <a:prstGeom prst="rect">
+            <a:avLst/>
+          </a:prstGeom>
+        </p:spPr>
+      </p:pic>
+      <p:pic>
+        <p:nvPicPr>
+          <p:cNvPr id="13" name="Picture 12">
+            <a:extLst>
+              <a:ext uri="{FF2B5EF4-FFF2-40B4-BE49-F238E27FC236}">
+                <a16:creationId xmlns:a16="http://schemas.microsoft.com/office/drawing/2014/main" id="{BF9EF45C-C104-8DFE-D4B1-8DD71A305628}"/>
+              </a:ext>
+            </a:extLst>
+          </p:cNvPr>
+          <p:cNvPicPr>
+            <a:picLocks noChangeAspect="1"/>
+          </p:cNvPicPr>
+          <p:nvPr/>
+        </p:nvPicPr>
+        <p:blipFill>
+          <a:blip r:embed="rId11"/>
+          <a:stretch>
+            <a:fillRect/>
+          </a:stretch>
+        </p:blipFill>
+        <p:spPr>
+          <a:xfrm>
+            <a:off x="4398214" y="1769018"/>
+            <a:ext cx="1653872" cy="1659982"/>
+          </a:xfrm>
+          <a:prstGeom prst="rect">
+            <a:avLst/>
+          </a:prstGeom>
         </p:spPr>
       </p:pic>
     </p:spTree>

</xml_diff>

<commit_message>
Updated Documentation and created mask key
</commit_message>
<xml_diff>
--- a/z.ReadMeAssets/ASeGrapheneDetector.pptx
+++ b/z.ReadMeAssets/ASeGrapheneDetector.pptx
@@ -263,7 +263,7 @@
           <a:p>
             <a:fld id="{0FDF81D3-AF8D-4441-8312-2AC07D86F629}" type="datetimeFigureOut">
               <a:rPr lang="en-US" smtClean="0"/>
-              <a:t>10/7/2024</a:t>
+              <a:t>10/9/2024</a:t>
             </a:fld>
             <a:endParaRPr lang="en-US"/>
           </a:p>
@@ -461,7 +461,7 @@
           <a:p>
             <a:fld id="{0FDF81D3-AF8D-4441-8312-2AC07D86F629}" type="datetimeFigureOut">
               <a:rPr lang="en-US" smtClean="0"/>
-              <a:t>10/7/2024</a:t>
+              <a:t>10/9/2024</a:t>
             </a:fld>
             <a:endParaRPr lang="en-US"/>
           </a:p>
@@ -669,7 +669,7 @@
           <a:p>
             <a:fld id="{0FDF81D3-AF8D-4441-8312-2AC07D86F629}" type="datetimeFigureOut">
               <a:rPr lang="en-US" smtClean="0"/>
-              <a:t>10/7/2024</a:t>
+              <a:t>10/9/2024</a:t>
             </a:fld>
             <a:endParaRPr lang="en-US"/>
           </a:p>
@@ -867,7 +867,7 @@
           <a:p>
             <a:fld id="{0FDF81D3-AF8D-4441-8312-2AC07D86F629}" type="datetimeFigureOut">
               <a:rPr lang="en-US" smtClean="0"/>
-              <a:t>10/7/2024</a:t>
+              <a:t>10/9/2024</a:t>
             </a:fld>
             <a:endParaRPr lang="en-US"/>
           </a:p>
@@ -1142,7 +1142,7 @@
           <a:p>
             <a:fld id="{0FDF81D3-AF8D-4441-8312-2AC07D86F629}" type="datetimeFigureOut">
               <a:rPr lang="en-US" smtClean="0"/>
-              <a:t>10/7/2024</a:t>
+              <a:t>10/9/2024</a:t>
             </a:fld>
             <a:endParaRPr lang="en-US"/>
           </a:p>
@@ -1407,7 +1407,7 @@
           <a:p>
             <a:fld id="{0FDF81D3-AF8D-4441-8312-2AC07D86F629}" type="datetimeFigureOut">
               <a:rPr lang="en-US" smtClean="0"/>
-              <a:t>10/7/2024</a:t>
+              <a:t>10/9/2024</a:t>
             </a:fld>
             <a:endParaRPr lang="en-US"/>
           </a:p>
@@ -1819,7 +1819,7 @@
           <a:p>
             <a:fld id="{0FDF81D3-AF8D-4441-8312-2AC07D86F629}" type="datetimeFigureOut">
               <a:rPr lang="en-US" smtClean="0"/>
-              <a:t>10/7/2024</a:t>
+              <a:t>10/9/2024</a:t>
             </a:fld>
             <a:endParaRPr lang="en-US"/>
           </a:p>
@@ -1960,7 +1960,7 @@
           <a:p>
             <a:fld id="{0FDF81D3-AF8D-4441-8312-2AC07D86F629}" type="datetimeFigureOut">
               <a:rPr lang="en-US" smtClean="0"/>
-              <a:t>10/7/2024</a:t>
+              <a:t>10/9/2024</a:t>
             </a:fld>
             <a:endParaRPr lang="en-US"/>
           </a:p>
@@ -2073,7 +2073,7 @@
           <a:p>
             <a:fld id="{0FDF81D3-AF8D-4441-8312-2AC07D86F629}" type="datetimeFigureOut">
               <a:rPr lang="en-US" smtClean="0"/>
-              <a:t>10/7/2024</a:t>
+              <a:t>10/9/2024</a:t>
             </a:fld>
             <a:endParaRPr lang="en-US"/>
           </a:p>
@@ -2384,7 +2384,7 @@
           <a:p>
             <a:fld id="{0FDF81D3-AF8D-4441-8312-2AC07D86F629}" type="datetimeFigureOut">
               <a:rPr lang="en-US" smtClean="0"/>
-              <a:t>10/7/2024</a:t>
+              <a:t>10/9/2024</a:t>
             </a:fld>
             <a:endParaRPr lang="en-US"/>
           </a:p>
@@ -2672,7 +2672,7 @@
           <a:p>
             <a:fld id="{0FDF81D3-AF8D-4441-8312-2AC07D86F629}" type="datetimeFigureOut">
               <a:rPr lang="en-US" smtClean="0"/>
-              <a:t>10/7/2024</a:t>
+              <a:t>10/9/2024</a:t>
             </a:fld>
             <a:endParaRPr lang="en-US"/>
           </a:p>
@@ -2913,7 +2913,7 @@
           <a:p>
             <a:fld id="{0FDF81D3-AF8D-4441-8312-2AC07D86F629}" type="datetimeFigureOut">
               <a:rPr lang="en-US" smtClean="0"/>
-              <a:t>10/7/2024</a:t>
+              <a:t>10/9/2024</a:t>
             </a:fld>
             <a:endParaRPr lang="en-US"/>
           </a:p>
@@ -3983,10 +3983,10 @@
       </p:pic>
       <p:pic>
         <p:nvPicPr>
-          <p:cNvPr id="9" name="Picture 8">
-            <a:extLst>
-              <a:ext uri="{FF2B5EF4-FFF2-40B4-BE49-F238E27FC236}">
-                <a16:creationId xmlns:a16="http://schemas.microsoft.com/office/drawing/2014/main" id="{120A6B85-FCDE-3631-3F8E-FBEA9997CB49}"/>
+          <p:cNvPr id="11" name="Picture 10">
+            <a:extLst>
+              <a:ext uri="{FF2B5EF4-FFF2-40B4-BE49-F238E27FC236}">
+                <a16:creationId xmlns:a16="http://schemas.microsoft.com/office/drawing/2014/main" id="{DB81CE09-B4CC-1E29-1466-E70D02D53A0C}"/>
               </a:ext>
             </a:extLst>
           </p:cNvPr>
@@ -3997,35 +3997,6 @@
         </p:nvPicPr>
         <p:blipFill>
           <a:blip r:embed="rId9"/>
-          <a:srcRect l="6187" t="4273" r="5388" b="7313"/>
-          <a:stretch/>
-        </p:blipFill>
-        <p:spPr>
-          <a:xfrm>
-            <a:off x="6156325" y="1775096"/>
-            <a:ext cx="1669530" cy="1659982"/>
-          </a:xfrm>
-          <a:prstGeom prst="rect">
-            <a:avLst/>
-          </a:prstGeom>
-        </p:spPr>
-      </p:pic>
-      <p:pic>
-        <p:nvPicPr>
-          <p:cNvPr id="11" name="Picture 10">
-            <a:extLst>
-              <a:ext uri="{FF2B5EF4-FFF2-40B4-BE49-F238E27FC236}">
-                <a16:creationId xmlns:a16="http://schemas.microsoft.com/office/drawing/2014/main" id="{DB81CE09-B4CC-1E29-1466-E70D02D53A0C}"/>
-              </a:ext>
-            </a:extLst>
-          </p:cNvPr>
-          <p:cNvPicPr>
-            <a:picLocks noChangeAspect="1"/>
-          </p:cNvPicPr>
-          <p:nvPr/>
-        </p:nvPicPr>
-        <p:blipFill>
-          <a:blip r:embed="rId10"/>
           <a:srcRect l="4822" t="1262" r="2689" b="1681"/>
           <a:stretch/>
         </p:blipFill>
@@ -4054,7 +4025,7 @@
           <p:nvPr/>
         </p:nvPicPr>
         <p:blipFill>
-          <a:blip r:embed="rId11"/>
+          <a:blip r:embed="rId10"/>
           <a:stretch>
             <a:fillRect/>
           </a:stretch>
@@ -4322,6 +4293,36 @@
           </a:p>
         </p:txBody>
       </p:sp>
+      <p:pic>
+        <p:nvPicPr>
+          <p:cNvPr id="29" name="Picture 28">
+            <a:extLst>
+              <a:ext uri="{FF2B5EF4-FFF2-40B4-BE49-F238E27FC236}">
+                <a16:creationId xmlns:a16="http://schemas.microsoft.com/office/drawing/2014/main" id="{C123DEB6-04D3-50BC-9ADA-B08E1087CCA9}"/>
+              </a:ext>
+            </a:extLst>
+          </p:cNvPr>
+          <p:cNvPicPr>
+            <a:picLocks noChangeAspect="1"/>
+          </p:cNvPicPr>
+          <p:nvPr/>
+        </p:nvPicPr>
+        <p:blipFill>
+          <a:blip r:embed="rId11"/>
+          <a:stretch>
+            <a:fillRect/>
+          </a:stretch>
+        </p:blipFill>
+        <p:spPr>
+          <a:xfrm>
+            <a:off x="6091278" y="1799296"/>
+            <a:ext cx="1653872" cy="1666539"/>
+          </a:xfrm>
+          <a:prstGeom prst="rect">
+            <a:avLst/>
+          </a:prstGeom>
+        </p:spPr>
+      </p:pic>
     </p:spTree>
     <p:extLst>
       <p:ext uri="{BB962C8B-B14F-4D97-AF65-F5344CB8AC3E}">
@@ -4473,7 +4474,7 @@
               <a:pPr algn="ctr"/>
               <a:r>
                 <a:rPr lang="en-US" b="1" dirty="0"/>
-                <a:t>Testing Stand</a:t>
+                <a:t>Temperature Testing Stand</a:t>
               </a:r>
             </a:p>
           </p:txBody>

</xml_diff>

<commit_message>
Updated documentation for test stand links
</commit_message>
<xml_diff>
--- a/z.ReadMeAssets/ASeGrapheneDetector.pptx
+++ b/z.ReadMeAssets/ASeGrapheneDetector.pptx
@@ -4353,216 +4353,41 @@
           <a:chExt cx="0" cy="0"/>
         </a:xfrm>
       </p:grpSpPr>
-      <p:grpSp>
-        <p:nvGrpSpPr>
-          <p:cNvPr id="35" name="Group 34">
-            <a:extLst>
-              <a:ext uri="{FF2B5EF4-FFF2-40B4-BE49-F238E27FC236}">
-                <a16:creationId xmlns:a16="http://schemas.microsoft.com/office/drawing/2014/main" id="{729D0BCE-A304-BDE0-22CB-F3FC77C849EA}"/>
-              </a:ext>
-            </a:extLst>
-          </p:cNvPr>
-          <p:cNvGrpSpPr/>
+      <p:pic>
+        <p:nvPicPr>
+          <p:cNvPr id="7" name="Picture 6">
+            <a:extLst>
+              <a:ext uri="{FF2B5EF4-FFF2-40B4-BE49-F238E27FC236}">
+                <a16:creationId xmlns:a16="http://schemas.microsoft.com/office/drawing/2014/main" id="{BE9AB88E-CC30-6727-F7E5-7E59B2BFBA33}"/>
+              </a:ext>
+            </a:extLst>
+          </p:cNvPr>
+          <p:cNvPicPr>
+            <a:picLocks noChangeAspect="1"/>
+          </p:cNvPicPr>
           <p:nvPr/>
-        </p:nvGrpSpPr>
-        <p:grpSpPr>
+        </p:nvPicPr>
+        <p:blipFill>
+          <a:blip r:embed="rId2"/>
+          <a:srcRect l="10925" t="4154" r="14219" b="6703"/>
+          <a:stretch/>
+        </p:blipFill>
+        <p:spPr>
           <a:xfrm>
-            <a:off x="8515350" y="94493"/>
-            <a:ext cx="3583907" cy="6725936"/>
-            <a:chOff x="8712200" y="94493"/>
-            <a:chExt cx="3583907" cy="6725936"/>
-          </a:xfrm>
-        </p:grpSpPr>
-        <p:pic>
-          <p:nvPicPr>
-            <p:cNvPr id="7" name="Picture 6">
-              <a:extLst>
-                <a:ext uri="{FF2B5EF4-FFF2-40B4-BE49-F238E27FC236}">
-                  <a16:creationId xmlns:a16="http://schemas.microsoft.com/office/drawing/2014/main" id="{BE9AB88E-CC30-6727-F7E5-7E59B2BFBA33}"/>
-                </a:ext>
-              </a:extLst>
-            </p:cNvPr>
-            <p:cNvPicPr>
-              <a:picLocks noChangeAspect="1"/>
-            </p:cNvPicPr>
-            <p:nvPr/>
-          </p:nvPicPr>
-          <p:blipFill>
-            <a:blip r:embed="rId2"/>
-            <a:srcRect l="10925" t="4154" r="14219" b="6703"/>
-            <a:stretch/>
-          </p:blipFill>
-          <p:spPr>
-            <a:xfrm>
-              <a:off x="9073403" y="425725"/>
-              <a:ext cx="3093196" cy="5707756"/>
-            </a:xfrm>
-            <a:prstGeom prst="rect">
-              <a:avLst/>
-            </a:prstGeom>
-          </p:spPr>
-        </p:pic>
-        <p:pic>
-          <p:nvPicPr>
-            <p:cNvPr id="9" name="Picture 8" descr="A qr code with dots and circles&#10;&#10;Description automatically generated">
-              <a:extLst>
-                <a:ext uri="{FF2B5EF4-FFF2-40B4-BE49-F238E27FC236}">
-                  <a16:creationId xmlns:a16="http://schemas.microsoft.com/office/drawing/2014/main" id="{B1573B75-685F-18F6-DA06-7C7FE4FAC1B3}"/>
-                </a:ext>
-              </a:extLst>
-            </p:cNvPr>
-            <p:cNvPicPr>
-              <a:picLocks noChangeAspect="1"/>
-            </p:cNvPicPr>
-            <p:nvPr/>
-          </p:nvPicPr>
-          <p:blipFill>
-            <a:blip r:embed="rId3">
-              <a:extLst>
-                <a:ext uri="{28A0092B-C50C-407E-A947-70E740481C1C}">
-                  <a14:useLocalDpi xmlns:a14="http://schemas.microsoft.com/office/drawing/2010/main" val="0"/>
-                </a:ext>
-              </a:extLst>
-            </a:blip>
-            <a:stretch>
-              <a:fillRect/>
-            </a:stretch>
-          </p:blipFill>
-          <p:spPr>
-            <a:xfrm>
-              <a:off x="8959851" y="5385560"/>
-              <a:ext cx="1250947" cy="1250947"/>
-            </a:xfrm>
-            <a:prstGeom prst="rect">
-              <a:avLst/>
-            </a:prstGeom>
-          </p:spPr>
-        </p:pic>
-        <p:sp>
-          <p:nvSpPr>
-            <p:cNvPr id="10" name="TextBox 9">
-              <a:extLst>
-                <a:ext uri="{FF2B5EF4-FFF2-40B4-BE49-F238E27FC236}">
-                  <a16:creationId xmlns:a16="http://schemas.microsoft.com/office/drawing/2014/main" id="{82463922-2029-7F3F-7190-5C074C5E96B9}"/>
-                </a:ext>
-              </a:extLst>
-            </p:cNvPr>
-            <p:cNvSpPr txBox="1"/>
-            <p:nvPr/>
-          </p:nvSpPr>
-          <p:spPr>
-            <a:xfrm>
-              <a:off x="8966201" y="94493"/>
-              <a:ext cx="3200398" cy="369332"/>
-            </a:xfrm>
-            <a:prstGeom prst="rect">
-              <a:avLst/>
-            </a:prstGeom>
-            <a:noFill/>
-            <a:ln>
-              <a:solidFill>
-                <a:schemeClr val="tx1"/>
-              </a:solidFill>
-            </a:ln>
-          </p:spPr>
-          <p:txBody>
-            <a:bodyPr wrap="square" rtlCol="0">
-              <a:spAutoFit/>
-            </a:bodyPr>
-            <a:lstStyle/>
-            <a:p>
-              <a:pPr algn="ctr"/>
-              <a:r>
-                <a:rPr lang="en-US" b="1" dirty="0"/>
-                <a:t>Temperature Testing Stand</a:t>
-              </a:r>
-            </a:p>
-          </p:txBody>
-        </p:sp>
-        <p:sp>
-          <p:nvSpPr>
-            <p:cNvPr id="11" name="TextBox 10">
-              <a:extLst>
-                <a:ext uri="{FF2B5EF4-FFF2-40B4-BE49-F238E27FC236}">
-                  <a16:creationId xmlns:a16="http://schemas.microsoft.com/office/drawing/2014/main" id="{B8F4AFF6-6963-0E42-E978-84EBAA379CE8}"/>
-                </a:ext>
-              </a:extLst>
-            </p:cNvPr>
-            <p:cNvSpPr txBox="1"/>
-            <p:nvPr/>
-          </p:nvSpPr>
-          <p:spPr>
-            <a:xfrm>
-              <a:off x="8832850" y="6604985"/>
-              <a:ext cx="3463257" cy="215444"/>
-            </a:xfrm>
-            <a:prstGeom prst="rect">
-              <a:avLst/>
-            </a:prstGeom>
-            <a:noFill/>
-            <a:ln>
-              <a:noFill/>
-            </a:ln>
-          </p:spPr>
-          <p:txBody>
-            <a:bodyPr wrap="square" rtlCol="0">
-              <a:spAutoFit/>
-            </a:bodyPr>
-            <a:lstStyle/>
-            <a:p>
-              <a:pPr algn="ctr"/>
-              <a:r>
-                <a:rPr lang="en-US" sz="800" dirty="0"/>
-                <a:t>https://github.com/barajasalfredo13/ModuTherm-Wafer-Test-System</a:t>
-              </a:r>
-            </a:p>
-          </p:txBody>
-        </p:sp>
-        <p:cxnSp>
-          <p:nvCxnSpPr>
-            <p:cNvPr id="13" name="Straight Connector 12">
-              <a:extLst>
-                <a:ext uri="{FF2B5EF4-FFF2-40B4-BE49-F238E27FC236}">
-                  <a16:creationId xmlns:a16="http://schemas.microsoft.com/office/drawing/2014/main" id="{4AF4C4B9-A13E-67C7-8C1E-EA616D596551}"/>
-                </a:ext>
-              </a:extLst>
-            </p:cNvPr>
-            <p:cNvCxnSpPr>
-              <a:cxnSpLocks/>
-            </p:cNvCxnSpPr>
-            <p:nvPr/>
-          </p:nvCxnSpPr>
-          <p:spPr>
-            <a:xfrm flipV="1">
-              <a:off x="8712200" y="94493"/>
-              <a:ext cx="0" cy="6642857"/>
-            </a:xfrm>
-            <a:prstGeom prst="line">
-              <a:avLst/>
-            </a:prstGeom>
-          </p:spPr>
-          <p:style>
-            <a:lnRef idx="1">
-              <a:schemeClr val="dk1"/>
-            </a:lnRef>
-            <a:fillRef idx="0">
-              <a:schemeClr val="dk1"/>
-            </a:fillRef>
-            <a:effectRef idx="0">
-              <a:schemeClr val="dk1"/>
-            </a:effectRef>
-            <a:fontRef idx="minor">
-              <a:schemeClr val="tx1"/>
-            </a:fontRef>
-          </p:style>
-        </p:cxnSp>
-      </p:grpSp>
-      <p:sp>
-        <p:nvSpPr>
-          <p:cNvPr id="15" name="TextBox 14">
-            <a:extLst>
-              <a:ext uri="{FF2B5EF4-FFF2-40B4-BE49-F238E27FC236}">
-                <a16:creationId xmlns:a16="http://schemas.microsoft.com/office/drawing/2014/main" id="{23940311-9CFA-7439-1E39-9668F7892B15}"/>
+            <a:off x="8876553" y="425725"/>
+            <a:ext cx="3093196" cy="5707756"/>
+          </a:xfrm>
+          <a:prstGeom prst="rect">
+            <a:avLst/>
+          </a:prstGeom>
+        </p:spPr>
+      </p:pic>
+      <p:sp>
+        <p:nvSpPr>
+          <p:cNvPr id="10" name="TextBox 9">
+            <a:extLst>
+              <a:ext uri="{FF2B5EF4-FFF2-40B4-BE49-F238E27FC236}">
+                <a16:creationId xmlns:a16="http://schemas.microsoft.com/office/drawing/2014/main" id="{82463922-2029-7F3F-7190-5C074C5E96B9}"/>
               </a:ext>
             </a:extLst>
           </p:cNvPr>
@@ -4571,8 +4396,49 @@
         </p:nvSpPr>
         <p:spPr>
           <a:xfrm>
-            <a:off x="130176" y="55636"/>
-            <a:ext cx="8515349" cy="1754326"/>
+            <a:off x="8769351" y="94493"/>
+            <a:ext cx="3200398" cy="369332"/>
+          </a:xfrm>
+          <a:prstGeom prst="rect">
+            <a:avLst/>
+          </a:prstGeom>
+          <a:noFill/>
+          <a:ln>
+            <a:solidFill>
+              <a:schemeClr val="tx1"/>
+            </a:solidFill>
+          </a:ln>
+        </p:spPr>
+        <p:txBody>
+          <a:bodyPr wrap="square" rtlCol="0">
+            <a:spAutoFit/>
+          </a:bodyPr>
+          <a:lstStyle/>
+          <a:p>
+            <a:pPr algn="ctr"/>
+            <a:r>
+              <a:rPr lang="en-US" b="1" dirty="0"/>
+              <a:t>Temperature Testing Stand</a:t>
+            </a:r>
+          </a:p>
+        </p:txBody>
+      </p:sp>
+      <p:sp>
+        <p:nvSpPr>
+          <p:cNvPr id="11" name="TextBox 10">
+            <a:extLst>
+              <a:ext uri="{FF2B5EF4-FFF2-40B4-BE49-F238E27FC236}">
+                <a16:creationId xmlns:a16="http://schemas.microsoft.com/office/drawing/2014/main" id="{B8F4AFF6-6963-0E42-E978-84EBAA379CE8}"/>
+              </a:ext>
+            </a:extLst>
+          </p:cNvPr>
+          <p:cNvSpPr txBox="1"/>
+          <p:nvPr/>
+        </p:nvSpPr>
+        <p:spPr>
+          <a:xfrm>
+            <a:off x="8636000" y="6604985"/>
+            <a:ext cx="3463257" cy="215444"/>
           </a:xfrm>
           <a:prstGeom prst="rect">
             <a:avLst/>
@@ -4590,6 +4456,83 @@
           <a:p>
             <a:pPr algn="ctr"/>
             <a:r>
+              <a:rPr lang="en-US" sz="800" dirty="0"/>
+              <a:t>https://github.com/barajasalfredo13/Wafer-Temperature-Test-Stand</a:t>
+            </a:r>
+          </a:p>
+        </p:txBody>
+      </p:sp>
+      <p:cxnSp>
+        <p:nvCxnSpPr>
+          <p:cNvPr id="13" name="Straight Connector 12">
+            <a:extLst>
+              <a:ext uri="{FF2B5EF4-FFF2-40B4-BE49-F238E27FC236}">
+                <a16:creationId xmlns:a16="http://schemas.microsoft.com/office/drawing/2014/main" id="{4AF4C4B9-A13E-67C7-8C1E-EA616D596551}"/>
+              </a:ext>
+            </a:extLst>
+          </p:cNvPr>
+          <p:cNvCxnSpPr>
+            <a:cxnSpLocks/>
+          </p:cNvCxnSpPr>
+          <p:nvPr/>
+        </p:nvCxnSpPr>
+        <p:spPr>
+          <a:xfrm flipV="1">
+            <a:off x="8515350" y="94493"/>
+            <a:ext cx="0" cy="6642857"/>
+          </a:xfrm>
+          <a:prstGeom prst="line">
+            <a:avLst/>
+          </a:prstGeom>
+        </p:spPr>
+        <p:style>
+          <a:lnRef idx="1">
+            <a:schemeClr val="dk1"/>
+          </a:lnRef>
+          <a:fillRef idx="0">
+            <a:schemeClr val="dk1"/>
+          </a:fillRef>
+          <a:effectRef idx="0">
+            <a:schemeClr val="dk1"/>
+          </a:effectRef>
+          <a:fontRef idx="minor">
+            <a:schemeClr val="tx1"/>
+          </a:fontRef>
+        </p:style>
+      </p:cxnSp>
+      <p:sp>
+        <p:nvSpPr>
+          <p:cNvPr id="15" name="TextBox 14">
+            <a:extLst>
+              <a:ext uri="{FF2B5EF4-FFF2-40B4-BE49-F238E27FC236}">
+                <a16:creationId xmlns:a16="http://schemas.microsoft.com/office/drawing/2014/main" id="{23940311-9CFA-7439-1E39-9668F7892B15}"/>
+              </a:ext>
+            </a:extLst>
+          </p:cNvPr>
+          <p:cNvSpPr txBox="1"/>
+          <p:nvPr/>
+        </p:nvSpPr>
+        <p:spPr>
+          <a:xfrm>
+            <a:off x="130176" y="55636"/>
+            <a:ext cx="8515349" cy="1754326"/>
+          </a:xfrm>
+          <a:prstGeom prst="rect">
+            <a:avLst/>
+          </a:prstGeom>
+          <a:noFill/>
+          <a:ln>
+            <a:noFill/>
+          </a:ln>
+        </p:spPr>
+        <p:txBody>
+          <a:bodyPr wrap="square" rtlCol="0">
+            <a:spAutoFit/>
+          </a:bodyPr>
+          <a:lstStyle/>
+          <a:p>
+            <a:pPr algn="ctr"/>
+            <a:r>
               <a:rPr lang="en-US" sz="3600" b="1" dirty="0"/>
               <a:t>Design for Amorphous Selenium shadow masks used in experimental work for VUV </a:t>
             </a:r>
@@ -4616,7 +4559,7 @@
           <p:nvPr/>
         </p:nvPicPr>
         <p:blipFill>
-          <a:blip r:embed="rId4"/>
+          <a:blip r:embed="rId3"/>
           <a:srcRect l="3123" t="4072" r="4058" b="6123"/>
           <a:stretch/>
         </p:blipFill>
@@ -4624,6 +4567,42 @@
           <a:xfrm>
             <a:off x="1951253" y="1802755"/>
             <a:ext cx="4873194" cy="4809438"/>
+          </a:xfrm>
+          <a:prstGeom prst="rect">
+            <a:avLst/>
+          </a:prstGeom>
+        </p:spPr>
+      </p:pic>
+      <p:pic>
+        <p:nvPicPr>
+          <p:cNvPr id="3" name="Picture 2" descr="A qr code with black squares and circles&#10;&#10;Description automatically generated">
+            <a:extLst>
+              <a:ext uri="{FF2B5EF4-FFF2-40B4-BE49-F238E27FC236}">
+                <a16:creationId xmlns:a16="http://schemas.microsoft.com/office/drawing/2014/main" id="{1D64517A-ABE6-B031-96C2-8692C5F883E1}"/>
+              </a:ext>
+            </a:extLst>
+          </p:cNvPr>
+          <p:cNvPicPr>
+            <a:picLocks noChangeAspect="1"/>
+          </p:cNvPicPr>
+          <p:nvPr/>
+        </p:nvPicPr>
+        <p:blipFill>
+          <a:blip r:embed="rId4">
+            <a:extLst>
+              <a:ext uri="{28A0092B-C50C-407E-A947-70E740481C1C}">
+                <a14:useLocalDpi xmlns:a14="http://schemas.microsoft.com/office/drawing/2010/main" val="0"/>
+              </a:ext>
+            </a:extLst>
+          </a:blip>
+          <a:stretch>
+            <a:fillRect/>
+          </a:stretch>
+        </p:blipFill>
+        <p:spPr>
+          <a:xfrm>
+            <a:off x="8790193" y="5366290"/>
+            <a:ext cx="1268206" cy="1268206"/>
           </a:xfrm>
           <a:prstGeom prst="rect">
             <a:avLst/>

</xml_diff>

<commit_message>
Reverted Repository back to the old name
</commit_message>
<xml_diff>
--- a/z.ReadMeAssets/ASeGrapheneDetector.pptx
+++ b/z.ReadMeAssets/ASeGrapheneDetector.pptx
@@ -4457,7 +4457,7 @@
             <a:pPr algn="ctr"/>
             <a:r>
               <a:rPr lang="en-US" sz="800" dirty="0"/>
-              <a:t>https://github.com/barajasalfredo13/Wafer-Temperature-Test-Stand</a:t>
+              <a:t>https://github.com/barajasalfredo13/ModuTherm-Wafer-Test-System</a:t>
             </a:r>
           </a:p>
         </p:txBody>
@@ -4575,10 +4575,10 @@
       </p:pic>
       <p:pic>
         <p:nvPicPr>
-          <p:cNvPr id="3" name="Picture 2" descr="A qr code with black squares and circles&#10;&#10;Description automatically generated">
-            <a:extLst>
-              <a:ext uri="{FF2B5EF4-FFF2-40B4-BE49-F238E27FC236}">
-                <a16:creationId xmlns:a16="http://schemas.microsoft.com/office/drawing/2014/main" id="{1D64517A-ABE6-B031-96C2-8692C5F883E1}"/>
+          <p:cNvPr id="4" name="Picture 3" descr="A qr code with dots and circles&#10;&#10;Description automatically generated">
+            <a:extLst>
+              <a:ext uri="{FF2B5EF4-FFF2-40B4-BE49-F238E27FC236}">
+                <a16:creationId xmlns:a16="http://schemas.microsoft.com/office/drawing/2014/main" id="{60C3DC7B-B7A6-DD9D-16D8-93A0DDE15318}"/>
               </a:ext>
             </a:extLst>
           </p:cNvPr>
@@ -4601,8 +4601,8 @@
         </p:blipFill>
         <p:spPr>
           <a:xfrm>
-            <a:off x="8790193" y="5366290"/>
-            <a:ext cx="1268206" cy="1268206"/>
+            <a:off x="8819403" y="5443301"/>
+            <a:ext cx="1214693" cy="1214693"/>
           </a:xfrm>
           <a:prstGeom prst="rect">
             <a:avLst/>

</xml_diff>